<commit_message>
Added results for optimization varying N
</commit_message>
<xml_diff>
--- a/summaries/Accuracy.pptx
+++ b/summaries/Accuracy.pptx
@@ -11,6 +11,9 @@
     <p:sldId id="259" r:id="rId5"/>
     <p:sldId id="260" r:id="rId6"/>
     <p:sldId id="262" r:id="rId7"/>
+    <p:sldId id="264" r:id="rId8"/>
+    <p:sldId id="265" r:id="rId9"/>
+    <p:sldId id="266" r:id="rId10"/>
   </p:sldIdLst>
   <p:sldSz cx="12192000" cy="6858000"/>
   <p:notesSz cx="6858000" cy="9144000"/>
@@ -109,6 +112,11 @@
       </a:defRPr>
     </a:lvl9pPr>
   </p:defaultTextStyle>
+  <p:extLst>
+    <p:ext uri="{EFAFB233-063F-42B5-8137-9DF3F51BA10A}">
+      <p15:sldGuideLst xmlns:p15="http://schemas.microsoft.com/office/powerpoint/2012/main"/>
+    </p:ext>
+  </p:extLst>
 </p:presentation>
 </file>
 
@@ -259,7 +267,7 @@
           <a:p>
             <a:fld id="{72B706CA-5EA8-4047-82BA-A3860F17F7ED}" type="datetimeFigureOut">
               <a:rPr lang="en-US" smtClean="0"/>
-              <a:t>2/18/2024</a:t>
+              <a:t>2/21/2024</a:t>
             </a:fld>
             <a:endParaRPr lang="en-US"/>
           </a:p>
@@ -457,7 +465,7 @@
           <a:p>
             <a:fld id="{72B706CA-5EA8-4047-82BA-A3860F17F7ED}" type="datetimeFigureOut">
               <a:rPr lang="en-US" smtClean="0"/>
-              <a:t>2/18/2024</a:t>
+              <a:t>2/21/2024</a:t>
             </a:fld>
             <a:endParaRPr lang="en-US"/>
           </a:p>
@@ -665,7 +673,7 @@
           <a:p>
             <a:fld id="{72B706CA-5EA8-4047-82BA-A3860F17F7ED}" type="datetimeFigureOut">
               <a:rPr lang="en-US" smtClean="0"/>
-              <a:t>2/18/2024</a:t>
+              <a:t>2/21/2024</a:t>
             </a:fld>
             <a:endParaRPr lang="en-US"/>
           </a:p>
@@ -863,7 +871,7 @@
           <a:p>
             <a:fld id="{72B706CA-5EA8-4047-82BA-A3860F17F7ED}" type="datetimeFigureOut">
               <a:rPr lang="en-US" smtClean="0"/>
-              <a:t>2/18/2024</a:t>
+              <a:t>2/21/2024</a:t>
             </a:fld>
             <a:endParaRPr lang="en-US"/>
           </a:p>
@@ -1138,7 +1146,7 @@
           <a:p>
             <a:fld id="{72B706CA-5EA8-4047-82BA-A3860F17F7ED}" type="datetimeFigureOut">
               <a:rPr lang="en-US" smtClean="0"/>
-              <a:t>2/18/2024</a:t>
+              <a:t>2/21/2024</a:t>
             </a:fld>
             <a:endParaRPr lang="en-US"/>
           </a:p>
@@ -1403,7 +1411,7 @@
           <a:p>
             <a:fld id="{72B706CA-5EA8-4047-82BA-A3860F17F7ED}" type="datetimeFigureOut">
               <a:rPr lang="en-US" smtClean="0"/>
-              <a:t>2/18/2024</a:t>
+              <a:t>2/21/2024</a:t>
             </a:fld>
             <a:endParaRPr lang="en-US"/>
           </a:p>
@@ -1815,7 +1823,7 @@
           <a:p>
             <a:fld id="{72B706CA-5EA8-4047-82BA-A3860F17F7ED}" type="datetimeFigureOut">
               <a:rPr lang="en-US" smtClean="0"/>
-              <a:t>2/18/2024</a:t>
+              <a:t>2/21/2024</a:t>
             </a:fld>
             <a:endParaRPr lang="en-US"/>
           </a:p>
@@ -1956,7 +1964,7 @@
           <a:p>
             <a:fld id="{72B706CA-5EA8-4047-82BA-A3860F17F7ED}" type="datetimeFigureOut">
               <a:rPr lang="en-US" smtClean="0"/>
-              <a:t>2/18/2024</a:t>
+              <a:t>2/21/2024</a:t>
             </a:fld>
             <a:endParaRPr lang="en-US"/>
           </a:p>
@@ -2069,7 +2077,7 @@
           <a:p>
             <a:fld id="{72B706CA-5EA8-4047-82BA-A3860F17F7ED}" type="datetimeFigureOut">
               <a:rPr lang="en-US" smtClean="0"/>
-              <a:t>2/18/2024</a:t>
+              <a:t>2/21/2024</a:t>
             </a:fld>
             <a:endParaRPr lang="en-US"/>
           </a:p>
@@ -2380,7 +2388,7 @@
           <a:p>
             <a:fld id="{72B706CA-5EA8-4047-82BA-A3860F17F7ED}" type="datetimeFigureOut">
               <a:rPr lang="en-US" smtClean="0"/>
-              <a:t>2/18/2024</a:t>
+              <a:t>2/21/2024</a:t>
             </a:fld>
             <a:endParaRPr lang="en-US"/>
           </a:p>
@@ -2668,7 +2676,7 @@
           <a:p>
             <a:fld id="{72B706CA-5EA8-4047-82BA-A3860F17F7ED}" type="datetimeFigureOut">
               <a:rPr lang="en-US" smtClean="0"/>
-              <a:t>2/18/2024</a:t>
+              <a:t>2/21/2024</a:t>
             </a:fld>
             <a:endParaRPr lang="en-US"/>
           </a:p>
@@ -2909,7 +2917,7 @@
           <a:p>
             <a:fld id="{72B706CA-5EA8-4047-82BA-A3860F17F7ED}" type="datetimeFigureOut">
               <a:rPr lang="en-US" smtClean="0"/>
-              <a:t>2/18/2024</a:t>
+              <a:t>2/21/2024</a:t>
             </a:fld>
             <a:endParaRPr lang="en-US"/>
           </a:p>
@@ -4013,6 +4021,295 @@
 </p:sld>
 </file>
 
+<file path=ppt/slides/slide7.xml><?xml version="1.0" encoding="utf-8"?>
+<p:sld xmlns:a="http://schemas.openxmlformats.org/drawingml/2006/main" xmlns:r="http://schemas.openxmlformats.org/officeDocument/2006/relationships" xmlns:p="http://schemas.openxmlformats.org/presentationml/2006/main">
+  <p:cSld>
+    <p:spTree>
+      <p:nvGrpSpPr>
+        <p:cNvPr id="1" name=""/>
+        <p:cNvGrpSpPr/>
+        <p:nvPr/>
+      </p:nvGrpSpPr>
+      <p:grpSpPr>
+        <a:xfrm>
+          <a:off x="0" y="0"/>
+          <a:ext cx="0" cy="0"/>
+          <a:chOff x="0" y="0"/>
+          <a:chExt cx="0" cy="0"/>
+        </a:xfrm>
+      </p:grpSpPr>
+      <p:sp>
+        <p:nvSpPr>
+          <p:cNvPr id="2" name="Title 1">
+            <a:extLst>
+              <a:ext uri="{FF2B5EF4-FFF2-40B4-BE49-F238E27FC236}">
+                <a16:creationId xmlns:a16="http://schemas.microsoft.com/office/drawing/2014/main" id="{03E3850F-43CA-B70D-1619-855D273FAAB0}"/>
+              </a:ext>
+            </a:extLst>
+          </p:cNvPr>
+          <p:cNvSpPr>
+            <a:spLocks noGrp="1"/>
+          </p:cNvSpPr>
+          <p:nvPr>
+            <p:ph type="title"/>
+          </p:nvPr>
+        </p:nvSpPr>
+        <p:spPr/>
+        <p:txBody>
+          <a:bodyPr/>
+          <a:lstStyle/>
+          <a:p>
+            <a:r>
+              <a:rPr lang="en-US" dirty="0"/>
+              <a:t>Particle count effects on optimization setup</a:t>
+            </a:r>
+          </a:p>
+        </p:txBody>
+      </p:sp>
+      <p:sp>
+        <p:nvSpPr>
+          <p:cNvPr id="3" name="Content Placeholder 2">
+            <a:extLst>
+              <a:ext uri="{FF2B5EF4-FFF2-40B4-BE49-F238E27FC236}">
+                <a16:creationId xmlns:a16="http://schemas.microsoft.com/office/drawing/2014/main" id="{5F9510D7-1DA3-D5DC-CCFC-642B29D91454}"/>
+              </a:ext>
+            </a:extLst>
+          </p:cNvPr>
+          <p:cNvSpPr>
+            <a:spLocks noGrp="1"/>
+          </p:cNvSpPr>
+          <p:nvPr>
+            <p:ph idx="1"/>
+          </p:nvPr>
+        </p:nvSpPr>
+        <p:spPr/>
+        <p:txBody>
+          <a:bodyPr/>
+          <a:lstStyle/>
+          <a:p>
+            <a:r>
+              <a:rPr lang="en-US" dirty="0"/>
+              <a:t>For each value of N, I generated a distribution with that many particles and optimized for x-emit on that distribution. I then repeated this 30 times for each value.</a:t>
+            </a:r>
+          </a:p>
+          <a:p>
+            <a:r>
+              <a:rPr lang="en-US" dirty="0"/>
+              <a:t>Notably, there's another way you could do this where you generate a new distribution at each optimization step. I'm unsure how that would affect the results</a:t>
+            </a:r>
+          </a:p>
+        </p:txBody>
+      </p:sp>
+    </p:spTree>
+    <p:extLst>
+      <p:ext uri="{BB962C8B-B14F-4D97-AF65-F5344CB8AC3E}">
+        <p14:creationId xmlns:p14="http://schemas.microsoft.com/office/powerpoint/2010/main" val="3671229146"/>
+      </p:ext>
+    </p:extLst>
+  </p:cSld>
+  <p:clrMapOvr>
+    <a:masterClrMapping/>
+  </p:clrMapOvr>
+</p:sld>
+</file>
+
+<file path=ppt/slides/slide8.xml><?xml version="1.0" encoding="utf-8"?>
+<p:sld xmlns:a="http://schemas.openxmlformats.org/drawingml/2006/main" xmlns:r="http://schemas.openxmlformats.org/officeDocument/2006/relationships" xmlns:p="http://schemas.openxmlformats.org/presentationml/2006/main">
+  <p:cSld>
+    <p:spTree>
+      <p:nvGrpSpPr>
+        <p:cNvPr id="1" name=""/>
+        <p:cNvGrpSpPr/>
+        <p:nvPr/>
+      </p:nvGrpSpPr>
+      <p:grpSpPr>
+        <a:xfrm>
+          <a:off x="0" y="0"/>
+          <a:ext cx="0" cy="0"/>
+          <a:chOff x="0" y="0"/>
+          <a:chExt cx="0" cy="0"/>
+        </a:xfrm>
+      </p:grpSpPr>
+      <p:sp>
+        <p:nvSpPr>
+          <p:cNvPr id="2" name="Title 1">
+            <a:extLst>
+              <a:ext uri="{FF2B5EF4-FFF2-40B4-BE49-F238E27FC236}">
+                <a16:creationId xmlns:a16="http://schemas.microsoft.com/office/drawing/2014/main" id="{094FDD7E-83E3-2ECF-923A-5BF22DE32A85}"/>
+              </a:ext>
+            </a:extLst>
+          </p:cNvPr>
+          <p:cNvSpPr>
+            <a:spLocks noGrp="1"/>
+          </p:cNvSpPr>
+          <p:nvPr>
+            <p:ph type="title"/>
+          </p:nvPr>
+        </p:nvSpPr>
+        <p:spPr/>
+        <p:txBody>
+          <a:bodyPr/>
+          <a:lstStyle/>
+          <a:p>
+            <a:r>
+              <a:rPr lang="en-US" dirty="0"/>
+              <a:t>Particle count effects on optimization</a:t>
+            </a:r>
+          </a:p>
+        </p:txBody>
+      </p:sp>
+      <p:pic>
+        <p:nvPicPr>
+          <p:cNvPr id="5" name="Content Placeholder 4" descr="A graph of different sizes and shapes&#10;&#10;Description automatically generated with medium confidence">
+            <a:extLst>
+              <a:ext uri="{FF2B5EF4-FFF2-40B4-BE49-F238E27FC236}">
+                <a16:creationId xmlns:a16="http://schemas.microsoft.com/office/drawing/2014/main" id="{4A12FDB1-98DA-5A30-9096-E697410996C7}"/>
+              </a:ext>
+            </a:extLst>
+          </p:cNvPr>
+          <p:cNvPicPr>
+            <a:picLocks noGrp="1" noChangeAspect="1"/>
+          </p:cNvPicPr>
+          <p:nvPr>
+            <p:ph idx="1"/>
+          </p:nvPr>
+        </p:nvPicPr>
+        <p:blipFill>
+          <a:blip r:embed="rId2">
+            <a:extLst>
+              <a:ext uri="{28A0092B-C50C-407E-A947-70E740481C1C}">
+                <a14:useLocalDpi xmlns:a14="http://schemas.microsoft.com/office/drawing/2010/main" val="0"/>
+              </a:ext>
+            </a:extLst>
+          </a:blip>
+          <a:stretch>
+            <a:fillRect/>
+          </a:stretch>
+        </p:blipFill>
+        <p:spPr>
+          <a:xfrm>
+            <a:off x="2042442" y="1825625"/>
+            <a:ext cx="8107116" cy="4351338"/>
+          </a:xfrm>
+        </p:spPr>
+      </p:pic>
+    </p:spTree>
+    <p:extLst>
+      <p:ext uri="{BB962C8B-B14F-4D97-AF65-F5344CB8AC3E}">
+        <p14:creationId xmlns:p14="http://schemas.microsoft.com/office/powerpoint/2010/main" val="2080418495"/>
+      </p:ext>
+    </p:extLst>
+  </p:cSld>
+  <p:clrMapOvr>
+    <a:masterClrMapping/>
+  </p:clrMapOvr>
+</p:sld>
+</file>
+
+<file path=ppt/slides/slide9.xml><?xml version="1.0" encoding="utf-8"?>
+<p:sld xmlns:a="http://schemas.openxmlformats.org/drawingml/2006/main" xmlns:r="http://schemas.openxmlformats.org/officeDocument/2006/relationships" xmlns:p="http://schemas.openxmlformats.org/presentationml/2006/main">
+  <p:cSld>
+    <p:spTree>
+      <p:nvGrpSpPr>
+        <p:cNvPr id="1" name=""/>
+        <p:cNvGrpSpPr/>
+        <p:nvPr/>
+      </p:nvGrpSpPr>
+      <p:grpSpPr>
+        <a:xfrm>
+          <a:off x="0" y="0"/>
+          <a:ext cx="0" cy="0"/>
+          <a:chOff x="0" y="0"/>
+          <a:chExt cx="0" cy="0"/>
+        </a:xfrm>
+      </p:grpSpPr>
+      <p:sp>
+        <p:nvSpPr>
+          <p:cNvPr id="2" name="Title 1">
+            <a:extLst>
+              <a:ext uri="{FF2B5EF4-FFF2-40B4-BE49-F238E27FC236}">
+                <a16:creationId xmlns:a16="http://schemas.microsoft.com/office/drawing/2014/main" id="{E617ACD2-E7A2-875D-F054-38007C154B7F}"/>
+              </a:ext>
+            </a:extLst>
+          </p:cNvPr>
+          <p:cNvSpPr>
+            <a:spLocks noGrp="1"/>
+          </p:cNvSpPr>
+          <p:nvPr>
+            <p:ph type="title"/>
+          </p:nvPr>
+        </p:nvSpPr>
+        <p:spPr/>
+        <p:txBody>
+          <a:bodyPr/>
+          <a:lstStyle/>
+          <a:p>
+            <a:r>
+              <a:rPr lang="en-US" dirty="0"/>
+              <a:t>Observations</a:t>
+            </a:r>
+          </a:p>
+        </p:txBody>
+      </p:sp>
+      <p:sp>
+        <p:nvSpPr>
+          <p:cNvPr id="3" name="Content Placeholder 2">
+            <a:extLst>
+              <a:ext uri="{FF2B5EF4-FFF2-40B4-BE49-F238E27FC236}">
+                <a16:creationId xmlns:a16="http://schemas.microsoft.com/office/drawing/2014/main" id="{60F3FF4C-A0CA-3A82-D65C-20322936AB0B}"/>
+              </a:ext>
+            </a:extLst>
+          </p:cNvPr>
+          <p:cNvSpPr>
+            <a:spLocks noGrp="1"/>
+          </p:cNvSpPr>
+          <p:nvPr>
+            <p:ph idx="1"/>
+          </p:nvPr>
+        </p:nvSpPr>
+        <p:spPr/>
+        <p:txBody>
+          <a:bodyPr/>
+          <a:lstStyle/>
+          <a:p>
+            <a:r>
+              <a:rPr lang="en-US" dirty="0"/>
+              <a:t>Optimal length descends steadily with no substantial change in standard deviation, which is... concerning</a:t>
+            </a:r>
+          </a:p>
+          <a:p>
+            <a:r>
+              <a:rPr lang="en-US" dirty="0"/>
+              <a:t>Optimal half-angle remains stable with decreasing error (as we desire)</a:t>
+            </a:r>
+          </a:p>
+          <a:p>
+            <a:r>
+              <a:rPr lang="en-US" dirty="0"/>
+              <a:t>Best x-emit achieved: it seems the upper end of the initial range is the value it settles on as N increases</a:t>
+            </a:r>
+          </a:p>
+          <a:p>
+            <a:r>
+              <a:rPr lang="en-US" dirty="0"/>
+              <a:t>Simulation time is proportional to particle count as expected (I confirmed that the number of iterations to convergence is fairly constant)</a:t>
+            </a:r>
+          </a:p>
+        </p:txBody>
+      </p:sp>
+    </p:spTree>
+    <p:extLst>
+      <p:ext uri="{BB962C8B-B14F-4D97-AF65-F5344CB8AC3E}">
+        <p14:creationId xmlns:p14="http://schemas.microsoft.com/office/powerpoint/2010/main" val="524126981"/>
+      </p:ext>
+    </p:extLst>
+  </p:cSld>
+  <p:clrMapOvr>
+    <a:masterClrMapping/>
+  </p:clrMapOvr>
+</p:sld>
+</file>
+
 <file path=ppt/theme/theme1.xml><?xml version="1.0" encoding="utf-8"?>
 <a:theme xmlns:a="http://schemas.openxmlformats.org/drawingml/2006/main" name="Office Theme">
   <a:themeElements>

</xml_diff>